<commit_message>
added flappy bird added full_screen support added STRG+Q as quit event
</commit_message>
<xml_diff>
--- a/source/docs/source/_images/movement.pptx
+++ b/source/docs/source/_images/movement.pptx
@@ -104,6 +104,11 @@
       </a:defRPr>
     </a:lvl9pPr>
   </p:defaultTextStyle>
+  <p:extLst>
+    <p:ext uri="{EFAFB233-063F-42B5-8137-9DF3F51BA10A}">
+      <p15:sldGuideLst xmlns:p15="http://schemas.microsoft.com/office/powerpoint/2012/main"/>
+    </p:ext>
+  </p:extLst>
 </p:presentation>
 </file>
 
@@ -254,7 +259,7 @@
           <a:p>
             <a:fld id="{7FFF1D29-15D2-41D8-A061-7EFDDC8F4AF0}" type="datetimeFigureOut">
               <a:rPr lang="de-DE" smtClean="0"/>
-              <a:t>08.04.2019</a:t>
+              <a:t>27.04.2019</a:t>
             </a:fld>
             <a:endParaRPr lang="de-DE"/>
           </a:p>
@@ -452,7 +457,7 @@
           <a:p>
             <a:fld id="{7FFF1D29-15D2-41D8-A061-7EFDDC8F4AF0}" type="datetimeFigureOut">
               <a:rPr lang="de-DE" smtClean="0"/>
-              <a:t>08.04.2019</a:t>
+              <a:t>27.04.2019</a:t>
             </a:fld>
             <a:endParaRPr lang="de-DE"/>
           </a:p>
@@ -660,7 +665,7 @@
           <a:p>
             <a:fld id="{7FFF1D29-15D2-41D8-A061-7EFDDC8F4AF0}" type="datetimeFigureOut">
               <a:rPr lang="de-DE" smtClean="0"/>
-              <a:t>08.04.2019</a:t>
+              <a:t>27.04.2019</a:t>
             </a:fld>
             <a:endParaRPr lang="de-DE"/>
           </a:p>
@@ -858,7 +863,7 @@
           <a:p>
             <a:fld id="{7FFF1D29-15D2-41D8-A061-7EFDDC8F4AF0}" type="datetimeFigureOut">
               <a:rPr lang="de-DE" smtClean="0"/>
-              <a:t>08.04.2019</a:t>
+              <a:t>27.04.2019</a:t>
             </a:fld>
             <a:endParaRPr lang="de-DE"/>
           </a:p>
@@ -1133,7 +1138,7 @@
           <a:p>
             <a:fld id="{7FFF1D29-15D2-41D8-A061-7EFDDC8F4AF0}" type="datetimeFigureOut">
               <a:rPr lang="de-DE" smtClean="0"/>
-              <a:t>08.04.2019</a:t>
+              <a:t>27.04.2019</a:t>
             </a:fld>
             <a:endParaRPr lang="de-DE"/>
           </a:p>
@@ -1398,7 +1403,7 @@
           <a:p>
             <a:fld id="{7FFF1D29-15D2-41D8-A061-7EFDDC8F4AF0}" type="datetimeFigureOut">
               <a:rPr lang="de-DE" smtClean="0"/>
-              <a:t>08.04.2019</a:t>
+              <a:t>27.04.2019</a:t>
             </a:fld>
             <a:endParaRPr lang="de-DE"/>
           </a:p>
@@ -1810,7 +1815,7 @@
           <a:p>
             <a:fld id="{7FFF1D29-15D2-41D8-A061-7EFDDC8F4AF0}" type="datetimeFigureOut">
               <a:rPr lang="de-DE" smtClean="0"/>
-              <a:t>08.04.2019</a:t>
+              <a:t>27.04.2019</a:t>
             </a:fld>
             <a:endParaRPr lang="de-DE"/>
           </a:p>
@@ -1951,7 +1956,7 @@
           <a:p>
             <a:fld id="{7FFF1D29-15D2-41D8-A061-7EFDDC8F4AF0}" type="datetimeFigureOut">
               <a:rPr lang="de-DE" smtClean="0"/>
-              <a:t>08.04.2019</a:t>
+              <a:t>27.04.2019</a:t>
             </a:fld>
             <a:endParaRPr lang="de-DE"/>
           </a:p>
@@ -2064,7 +2069,7 @@
           <a:p>
             <a:fld id="{7FFF1D29-15D2-41D8-A061-7EFDDC8F4AF0}" type="datetimeFigureOut">
               <a:rPr lang="de-DE" smtClean="0"/>
-              <a:t>08.04.2019</a:t>
+              <a:t>27.04.2019</a:t>
             </a:fld>
             <a:endParaRPr lang="de-DE"/>
           </a:p>
@@ -2375,7 +2380,7 @@
           <a:p>
             <a:fld id="{7FFF1D29-15D2-41D8-A061-7EFDDC8F4AF0}" type="datetimeFigureOut">
               <a:rPr lang="de-DE" smtClean="0"/>
-              <a:t>08.04.2019</a:t>
+              <a:t>27.04.2019</a:t>
             </a:fld>
             <a:endParaRPr lang="de-DE"/>
           </a:p>
@@ -2663,7 +2668,7 @@
           <a:p>
             <a:fld id="{7FFF1D29-15D2-41D8-A061-7EFDDC8F4AF0}" type="datetimeFigureOut">
               <a:rPr lang="de-DE" smtClean="0"/>
-              <a:t>08.04.2019</a:t>
+              <a:t>27.04.2019</a:t>
             </a:fld>
             <a:endParaRPr lang="de-DE"/>
           </a:p>
@@ -2904,7 +2909,7 @@
           <a:p>
             <a:fld id="{7FFF1D29-15D2-41D8-A061-7EFDDC8F4AF0}" type="datetimeFigureOut">
               <a:rPr lang="de-DE" smtClean="0"/>
-              <a:t>08.04.2019</a:t>
+              <a:t>27.04.2019</a:t>
             </a:fld>
             <a:endParaRPr lang="de-DE"/>
           </a:p>
@@ -3365,7 +3370,7 @@
         <p:spPr>
           <a:xfrm>
             <a:off x="6736466" y="3229934"/>
-            <a:ext cx="3079689" cy="369332"/>
+            <a:ext cx="3217547" cy="369332"/>
           </a:xfrm>
           <a:prstGeom prst="rect">
             <a:avLst/>
@@ -3383,7 +3388,7 @@
                 <a:latin typeface="Liberation Mono" panose="02070409020205020404" pitchFamily="49" charset="0"/>
                 <a:cs typeface="Liberation Mono" panose="02070409020205020404" pitchFamily="49" charset="0"/>
               </a:rPr>
-              <a:t>0° „</a:t>
+              <a:t>90° „</a:t>
             </a:r>
             <a:r>
               <a:rPr lang="de-DE" dirty="0" err="1">
@@ -3397,10 +3402,23 @@
                 <a:latin typeface="Liberation Mono" panose="02070409020205020404" pitchFamily="49" charset="0"/>
                 <a:cs typeface="Liberation Mono" panose="02070409020205020404" pitchFamily="49" charset="0"/>
               </a:rPr>
-              <a:t>“, „</a:t>
+              <a:t>“, </a:t>
+            </a:r>
+            <a:r>
+              <a:rPr lang="de-DE" dirty="0">
+                <a:solidFill>
+                  <a:srgbClr val="FF0000"/>
+                </a:solidFill>
+                <a:latin typeface="Liberation Mono" panose="02070409020205020404" pitchFamily="49" charset="0"/>
+                <a:cs typeface="Liberation Mono" panose="02070409020205020404" pitchFamily="49" charset="0"/>
+              </a:rPr>
+              <a:t>„</a:t>
             </a:r>
             <a:r>
               <a:rPr lang="de-DE" dirty="0" err="1">
+                <a:solidFill>
+                  <a:srgbClr val="FF0000"/>
+                </a:solidFill>
                 <a:latin typeface="Liberation Mono" panose="02070409020205020404" pitchFamily="49" charset="0"/>
                 <a:cs typeface="Liberation Mono" panose="02070409020205020404" pitchFamily="49" charset="0"/>
               </a:rPr>
@@ -3408,6 +3426,9 @@
             </a:r>
             <a:r>
               <a:rPr lang="de-DE" dirty="0">
+                <a:solidFill>
+                  <a:srgbClr val="FF0000"/>
+                </a:solidFill>
                 <a:latin typeface="Liberation Mono" panose="02070409020205020404" pitchFamily="49" charset="0"/>
                 <a:cs typeface="Liberation Mono" panose="02070409020205020404" pitchFamily="49" charset="0"/>
               </a:rPr>
@@ -3430,8 +3451,8 @@
         </p:nvSpPr>
         <p:spPr>
           <a:xfrm>
-            <a:off x="5613436" y="2398996"/>
-            <a:ext cx="1287532" cy="369332"/>
+            <a:off x="5803659" y="2103355"/>
+            <a:ext cx="736099" cy="646331"/>
           </a:xfrm>
           <a:prstGeom prst="rect">
             <a:avLst/>
@@ -3449,7 +3470,7 @@
                 <a:latin typeface="Liberation Mono" panose="02070409020205020404" pitchFamily="49" charset="0"/>
                 <a:cs typeface="Liberation Mono" panose="02070409020205020404" pitchFamily="49" charset="0"/>
               </a:rPr>
-              <a:t>90° „</a:t>
+              <a:t>„</a:t>
             </a:r>
             <a:r>
               <a:rPr lang="de-DE" dirty="0" err="1">
@@ -3466,6 +3487,15 @@
               <a:t>“</a:t>
             </a:r>
           </a:p>
+          <a:p>
+            <a:r>
+              <a:rPr lang="de-DE" dirty="0">
+                <a:latin typeface="Liberation Mono" panose="02070409020205020404" pitchFamily="49" charset="0"/>
+                <a:cs typeface="Liberation Mono" panose="02070409020205020404" pitchFamily="49" charset="0"/>
+              </a:rPr>
+              <a:t>0°</a:t>
+            </a:r>
+          </a:p>
         </p:txBody>
       </p:sp>
       <p:sp>
@@ -3482,7 +3512,7 @@
         </p:nvSpPr>
         <p:spPr>
           <a:xfrm>
-            <a:off x="4730339" y="2413850"/>
+            <a:off x="4707852" y="2532037"/>
             <a:ext cx="873957" cy="369332"/>
           </a:xfrm>
           <a:prstGeom prst="rect">
@@ -3501,7 +3531,7 @@
                 <a:latin typeface="Liberation Mono" panose="02070409020205020404" pitchFamily="49" charset="0"/>
                 <a:cs typeface="Liberation Mono" panose="02070409020205020404" pitchFamily="49" charset="0"/>
               </a:rPr>
-              <a:t>135° </a:t>
+              <a:t>-45° </a:t>
             </a:r>
           </a:p>
         </p:txBody>
@@ -3539,7 +3569,7 @@
                 <a:latin typeface="Liberation Mono" panose="02070409020205020404" pitchFamily="49" charset="0"/>
                 <a:cs typeface="Liberation Mono" panose="02070409020205020404" pitchFamily="49" charset="0"/>
               </a:rPr>
-              <a:t>180° „</a:t>
+              <a:t>„</a:t>
             </a:r>
             <a:r>
               <a:rPr lang="de-DE" dirty="0" err="1">
@@ -3553,7 +3583,7 @@
                 <a:latin typeface="Liberation Mono" panose="02070409020205020404" pitchFamily="49" charset="0"/>
                 <a:cs typeface="Liberation Mono" panose="02070409020205020404" pitchFamily="49" charset="0"/>
               </a:rPr>
-              <a:t>“</a:t>
+              <a:t>“ -90°</a:t>
             </a:r>
           </a:p>
         </p:txBody>
@@ -3572,8 +3602,8 @@
         </p:nvSpPr>
         <p:spPr>
           <a:xfrm>
-            <a:off x="5437256" y="4131724"/>
-            <a:ext cx="1838965" cy="369332"/>
+            <a:off x="5144830" y="4082013"/>
+            <a:ext cx="1838965" cy="646331"/>
           </a:xfrm>
           <a:prstGeom prst="rect">
             <a:avLst/>
@@ -3586,12 +3616,23 @@
           </a:bodyPr>
           <a:lstStyle/>
           <a:p>
+            <a:pPr algn="ctr"/>
             <a:r>
               <a:rPr lang="de-DE" dirty="0">
                 <a:latin typeface="Liberation Mono" panose="02070409020205020404" pitchFamily="49" charset="0"/>
                 <a:cs typeface="Liberation Mono" panose="02070409020205020404" pitchFamily="49" charset="0"/>
               </a:rPr>
-              <a:t>270°  „down“</a:t>
+              <a:t>180°/-180°  </a:t>
+            </a:r>
+          </a:p>
+          <a:p>
+            <a:pPr algn="ctr"/>
+            <a:r>
+              <a:rPr lang="de-DE" dirty="0">
+                <a:latin typeface="Liberation Mono" panose="02070409020205020404" pitchFamily="49" charset="0"/>
+                <a:cs typeface="Liberation Mono" panose="02070409020205020404" pitchFamily="49" charset="0"/>
+              </a:rPr>
+              <a:t>„down“</a:t>
             </a:r>
           </a:p>
         </p:txBody>
@@ -3617,9 +3658,9 @@
             <a:avLst/>
           </a:prstGeom>
           <a:solidFill>
-            <a:schemeClr val="bg1">
+            <a:srgbClr val="FF0000">
               <a:alpha val="40000"/>
-            </a:schemeClr>
+            </a:srgbClr>
           </a:solidFill>
           <a:ln>
             <a:solidFill>

</xml_diff>